<commit_message>
editing home screen at blocking mode
</commit_message>
<xml_diff>
--- a/Docs/litrature Review/CDU screens for Nav Radio 2410141310.pptx
+++ b/Docs/litrature Review/CDU screens for Nav Radio 2410141310.pptx
@@ -18720,7 +18720,7 @@
         <p:spPr>
           <a:xfrm>
             <a:off x="762000" y="4343400"/>
-            <a:ext cx="7924800" cy="883975"/>
+            <a:ext cx="7924800" cy="882650"/>
           </a:xfrm>
           <a:prstGeom prst="rect">
             <a:avLst/>
@@ -18747,35 +18747,31 @@
             </a:r>
             <a:r>
               <a:rPr lang="en-US" sz="1300" dirty="0" smtClean="0"/>
-              <a:t>at locations P 1 to P </a:t>
+              <a:t>at locations P 1 to P 8. L</a:t>
             </a:r>
             <a:r>
               <a:rPr lang="en-US" sz="1300" dirty="0" smtClean="0"/>
-              <a:t>8. L</a:t>
+              <a:t>ocation P to P4 are shown on page </a:t>
             </a:r>
             <a:r>
               <a:rPr lang="en-US" sz="1300" dirty="0" smtClean="0"/>
-              <a:t>ocation P to </a:t>
+              <a:t>1, and locations P5 to P8 are shown on page to. Press “Next” button to see page </a:t>
             </a:r>
             <a:r>
               <a:rPr lang="en-US" sz="1300" dirty="0" smtClean="0"/>
-              <a:t>P4 are shown on page </a:t>
+              <a:t>2. Press </a:t>
+            </a:r>
+            <a:r>
+              <a:rPr lang="en-US" sz="1300" dirty="0" smtClean="0">
+                <a:highlight>
+                  <a:srgbClr val="FFFF00"/>
+                </a:highlight>
+              </a:rPr>
+              <a:t>BACK [Previous] </a:t>
             </a:r>
             <a:r>
               <a:rPr lang="en-US" sz="1300" dirty="0" smtClean="0"/>
-              <a:t>1, and locations P5 to P8 are shown on page to. Press </a:t>
-            </a:r>
-            <a:r>
-              <a:rPr lang="en-US" sz="1300" dirty="0" smtClean="0"/>
-              <a:t>“Next” button to see page </a:t>
-            </a:r>
-            <a:r>
-              <a:rPr lang="en-US" sz="1300" dirty="0" smtClean="0"/>
-              <a:t>2. </a:t>
-            </a:r>
-            <a:r>
-              <a:rPr lang="en-US" sz="1300" dirty="0" smtClean="0"/>
-              <a:t>Press BACK to go back to page 1.</a:t>
+              <a:t>to go back to page 1.</a:t>
             </a:r>
             <a:endParaRPr lang="en-US" sz="1300" dirty="0" smtClean="0"/>
           </a:p>

</xml_diff>